<commit_message>
dense grid for optimization; coarse grid for plotting
</commit_message>
<xml_diff>
--- a/Presentation1.pptx
+++ b/Presentation1.pptx
@@ -6,9 +6,12 @@
   </p:sldMasterIdLst>
   <p:sldIdLst>
     <p:sldId id="256" r:id="rId2"/>
+    <p:sldId id="257" r:id="rId3"/>
+    <p:sldId id="258" r:id="rId4"/>
+    <p:sldId id="259" r:id="rId5"/>
   </p:sldIdLst>
   <p:sldSz cx="12192000" cy="6858000"/>
-  <p:notesSz cx="6858000" cy="9144000"/>
+  <p:notesSz cx="7315200" cy="9601200"/>
   <p:defaultTextStyle>
     <a:defPPr>
       <a:defRPr lang="zh-TW"/>
@@ -104,6 +107,11 @@
       </a:defRPr>
     </a:lvl9pPr>
   </p:defaultTextStyle>
+  <p:extLst>
+    <p:ext uri="{EFAFB233-063F-42B5-8137-9DF3F51BA10A}">
+      <p15:sldGuideLst xmlns:p15="http://schemas.microsoft.com/office/powerpoint/2012/main"/>
+    </p:ext>
+  </p:extLst>
 </p:presentation>
 </file>
 
@@ -238,7 +246,7 @@
           <a:p>
             <a:fld id="{D638DB22-397D-48F1-BDCF-E66CBFA46A5C}" type="datetimeFigureOut">
               <a:rPr lang="zh-TW" altLang="en-US" smtClean="0"/>
-              <a:t>2015/11/9</a:t>
+              <a:t>2015/11/10</a:t>
             </a:fld>
             <a:endParaRPr lang="zh-TW" altLang="en-US"/>
           </a:p>
@@ -408,7 +416,7 @@
           <a:p>
             <a:fld id="{D638DB22-397D-48F1-BDCF-E66CBFA46A5C}" type="datetimeFigureOut">
               <a:rPr lang="zh-TW" altLang="en-US" smtClean="0"/>
-              <a:t>2015/11/9</a:t>
+              <a:t>2015/11/10</a:t>
             </a:fld>
             <a:endParaRPr lang="zh-TW" altLang="en-US"/>
           </a:p>
@@ -588,7 +596,7 @@
           <a:p>
             <a:fld id="{D638DB22-397D-48F1-BDCF-E66CBFA46A5C}" type="datetimeFigureOut">
               <a:rPr lang="zh-TW" altLang="en-US" smtClean="0"/>
-              <a:t>2015/11/9</a:t>
+              <a:t>2015/11/10</a:t>
             </a:fld>
             <a:endParaRPr lang="zh-TW" altLang="en-US"/>
           </a:p>
@@ -758,7 +766,7 @@
           <a:p>
             <a:fld id="{D638DB22-397D-48F1-BDCF-E66CBFA46A5C}" type="datetimeFigureOut">
               <a:rPr lang="zh-TW" altLang="en-US" smtClean="0"/>
-              <a:t>2015/11/9</a:t>
+              <a:t>2015/11/10</a:t>
             </a:fld>
             <a:endParaRPr lang="zh-TW" altLang="en-US"/>
           </a:p>
@@ -1004,7 +1012,7 @@
           <a:p>
             <a:fld id="{D638DB22-397D-48F1-BDCF-E66CBFA46A5C}" type="datetimeFigureOut">
               <a:rPr lang="zh-TW" altLang="en-US" smtClean="0"/>
-              <a:t>2015/11/9</a:t>
+              <a:t>2015/11/10</a:t>
             </a:fld>
             <a:endParaRPr lang="zh-TW" altLang="en-US"/>
           </a:p>
@@ -1236,7 +1244,7 @@
           <a:p>
             <a:fld id="{D638DB22-397D-48F1-BDCF-E66CBFA46A5C}" type="datetimeFigureOut">
               <a:rPr lang="zh-TW" altLang="en-US" smtClean="0"/>
-              <a:t>2015/11/9</a:t>
+              <a:t>2015/11/10</a:t>
             </a:fld>
             <a:endParaRPr lang="zh-TW" altLang="en-US"/>
           </a:p>
@@ -1603,7 +1611,7 @@
           <a:p>
             <a:fld id="{D638DB22-397D-48F1-BDCF-E66CBFA46A5C}" type="datetimeFigureOut">
               <a:rPr lang="zh-TW" altLang="en-US" smtClean="0"/>
-              <a:t>2015/11/9</a:t>
+              <a:t>2015/11/10</a:t>
             </a:fld>
             <a:endParaRPr lang="zh-TW" altLang="en-US"/>
           </a:p>
@@ -1721,7 +1729,7 @@
           <a:p>
             <a:fld id="{D638DB22-397D-48F1-BDCF-E66CBFA46A5C}" type="datetimeFigureOut">
               <a:rPr lang="zh-TW" altLang="en-US" smtClean="0"/>
-              <a:t>2015/11/9</a:t>
+              <a:t>2015/11/10</a:t>
             </a:fld>
             <a:endParaRPr lang="zh-TW" altLang="en-US"/>
           </a:p>
@@ -1816,7 +1824,7 @@
           <a:p>
             <a:fld id="{D638DB22-397D-48F1-BDCF-E66CBFA46A5C}" type="datetimeFigureOut">
               <a:rPr lang="zh-TW" altLang="en-US" smtClean="0"/>
-              <a:t>2015/11/9</a:t>
+              <a:t>2015/11/10</a:t>
             </a:fld>
             <a:endParaRPr lang="zh-TW" altLang="en-US"/>
           </a:p>
@@ -2093,7 +2101,7 @@
           <a:p>
             <a:fld id="{D638DB22-397D-48F1-BDCF-E66CBFA46A5C}" type="datetimeFigureOut">
               <a:rPr lang="zh-TW" altLang="en-US" smtClean="0"/>
-              <a:t>2015/11/9</a:t>
+              <a:t>2015/11/10</a:t>
             </a:fld>
             <a:endParaRPr lang="zh-TW" altLang="en-US"/>
           </a:p>
@@ -2346,7 +2354,7 @@
           <a:p>
             <a:fld id="{D638DB22-397D-48F1-BDCF-E66CBFA46A5C}" type="datetimeFigureOut">
               <a:rPr lang="zh-TW" altLang="en-US" smtClean="0"/>
-              <a:t>2015/11/9</a:t>
+              <a:t>2015/11/10</a:t>
             </a:fld>
             <a:endParaRPr lang="zh-TW" altLang="en-US"/>
           </a:p>
@@ -2441,8 +2449,8 @@
         </p:nvSpPr>
         <p:spPr>
           <a:xfrm>
-            <a:off x="838200" y="365125"/>
-            <a:ext cx="10515600" cy="1325563"/>
+            <a:off x="409575" y="365126"/>
+            <a:ext cx="11372850" cy="673100"/>
           </a:xfrm>
           <a:prstGeom prst="rect">
             <a:avLst/>
@@ -2455,10 +2463,10 @@
           <a:lstStyle/>
           <a:p>
             <a:r>
-              <a:rPr lang="en-US" altLang="zh-TW" smtClean="0"/>
+              <a:rPr lang="en-US" altLang="zh-TW" dirty="0" smtClean="0"/>
               <a:t>Click to edit Master title style</a:t>
             </a:r>
-            <a:endParaRPr lang="zh-TW" altLang="en-US"/>
+            <a:endParaRPr lang="zh-TW" altLang="en-US" dirty="0"/>
           </a:p>
         </p:txBody>
       </p:sp>
@@ -2474,8 +2482,8 @@
         </p:nvSpPr>
         <p:spPr>
           <a:xfrm>
-            <a:off x="838200" y="1825625"/>
-            <a:ext cx="10515600" cy="4351338"/>
+            <a:off x="409575" y="1171575"/>
+            <a:ext cx="11372850" cy="5005388"/>
           </a:xfrm>
           <a:prstGeom prst="rect">
             <a:avLst/>
@@ -2489,38 +2497,38 @@
           <a:p>
             <a:pPr lvl="0"/>
             <a:r>
-              <a:rPr lang="en-US" altLang="zh-TW" smtClean="0"/>
+              <a:rPr lang="en-US" altLang="zh-TW" dirty="0" smtClean="0"/>
               <a:t>Click to edit Master text styles</a:t>
             </a:r>
           </a:p>
           <a:p>
             <a:pPr lvl="1"/>
             <a:r>
-              <a:rPr lang="en-US" altLang="zh-TW" smtClean="0"/>
+              <a:rPr lang="en-US" altLang="zh-TW" dirty="0" smtClean="0"/>
               <a:t>Second level</a:t>
             </a:r>
           </a:p>
           <a:p>
             <a:pPr lvl="2"/>
             <a:r>
-              <a:rPr lang="en-US" altLang="zh-TW" smtClean="0"/>
+              <a:rPr lang="en-US" altLang="zh-TW" dirty="0" smtClean="0"/>
               <a:t>Third level</a:t>
             </a:r>
           </a:p>
           <a:p>
             <a:pPr lvl="3"/>
             <a:r>
-              <a:rPr lang="en-US" altLang="zh-TW" smtClean="0"/>
+              <a:rPr lang="en-US" altLang="zh-TW" dirty="0" smtClean="0"/>
               <a:t>Fourth level</a:t>
             </a:r>
           </a:p>
           <a:p>
             <a:pPr lvl="4"/>
             <a:r>
-              <a:rPr lang="en-US" altLang="zh-TW" smtClean="0"/>
+              <a:rPr lang="en-US" altLang="zh-TW" dirty="0" smtClean="0"/>
               <a:t>Fifth level</a:t>
             </a:r>
-            <a:endParaRPr lang="zh-TW" altLang="en-US"/>
+            <a:endParaRPr lang="zh-TW" altLang="en-US" dirty="0"/>
           </a:p>
         </p:txBody>
       </p:sp>
@@ -2559,7 +2567,7 @@
           <a:p>
             <a:fld id="{D638DB22-397D-48F1-BDCF-E66CBFA46A5C}" type="datetimeFigureOut">
               <a:rPr lang="zh-TW" altLang="en-US" smtClean="0"/>
-              <a:t>2015/11/9</a:t>
+              <a:t>2015/11/10</a:t>
             </a:fld>
             <a:endParaRPr lang="zh-TW" altLang="en-US"/>
           </a:p>
@@ -2674,7 +2682,7 @@
           <a:spcPct val="0"/>
         </a:spcBef>
         <a:buNone/>
-        <a:defRPr sz="4400" kern="1200">
+        <a:defRPr sz="3600" kern="1200">
           <a:solidFill>
             <a:schemeClr val="tx1"/>
           </a:solidFill>
@@ -3032,6 +3040,273 @@
 </p:sld>
 </file>
 
+<file path=ppt/slides/slide2.xml><?xml version="1.0" encoding="utf-8"?>
+<p:sld xmlns:a="http://schemas.openxmlformats.org/drawingml/2006/main" xmlns:r="http://schemas.openxmlformats.org/officeDocument/2006/relationships" xmlns:p="http://schemas.openxmlformats.org/presentationml/2006/main">
+  <p:cSld>
+    <p:spTree>
+      <p:nvGrpSpPr>
+        <p:cNvPr id="1" name=""/>
+        <p:cNvGrpSpPr/>
+        <p:nvPr/>
+      </p:nvGrpSpPr>
+      <p:grpSpPr>
+        <a:xfrm>
+          <a:off x="0" y="0"/>
+          <a:ext cx="0" cy="0"/>
+          <a:chOff x="0" y="0"/>
+          <a:chExt cx="0" cy="0"/>
+        </a:xfrm>
+      </p:grpSpPr>
+      <p:sp>
+        <p:nvSpPr>
+          <p:cNvPr id="4" name="Title 3"/>
+          <p:cNvSpPr>
+            <a:spLocks noGrp="1"/>
+          </p:cNvSpPr>
+          <p:nvPr>
+            <p:ph type="title"/>
+          </p:nvPr>
+        </p:nvSpPr>
+        <p:spPr/>
+        <p:txBody>
+          <a:bodyPr>
+            <a:normAutofit/>
+          </a:bodyPr>
+          <a:lstStyle/>
+          <a:p>
+            <a:r>
+              <a:rPr lang="en-US" altLang="zh-TW" dirty="0" smtClean="0"/>
+              <a:t>Supercritical air cooling</a:t>
+            </a:r>
+            <a:endParaRPr lang="zh-TW" altLang="en-US" dirty="0"/>
+          </a:p>
+        </p:txBody>
+      </p:sp>
+      <p:pic>
+        <p:nvPicPr>
+          <p:cNvPr id="8" name="Picture 7"/>
+          <p:cNvPicPr>
+            <a:picLocks noChangeAspect="1"/>
+          </p:cNvPicPr>
+          <p:nvPr/>
+        </p:nvPicPr>
+        <p:blipFill>
+          <a:blip r:embed="rId2"/>
+          <a:stretch>
+            <a:fillRect/>
+          </a:stretch>
+        </p:blipFill>
+        <p:spPr>
+          <a:xfrm>
+            <a:off x="0" y="1195744"/>
+            <a:ext cx="6227199" cy="4682853"/>
+          </a:xfrm>
+          <a:prstGeom prst="rect">
+            <a:avLst/>
+          </a:prstGeom>
+        </p:spPr>
+      </p:pic>
+      <p:pic>
+        <p:nvPicPr>
+          <p:cNvPr id="9" name="Picture 8"/>
+          <p:cNvPicPr>
+            <a:picLocks noChangeAspect="1"/>
+          </p:cNvPicPr>
+          <p:nvPr/>
+        </p:nvPicPr>
+        <p:blipFill>
+          <a:blip r:embed="rId3"/>
+          <a:stretch>
+            <a:fillRect/>
+          </a:stretch>
+        </p:blipFill>
+        <p:spPr>
+          <a:xfrm>
+            <a:off x="5960578" y="1179868"/>
+            <a:ext cx="6231422" cy="4686029"/>
+          </a:xfrm>
+          <a:prstGeom prst="rect">
+            <a:avLst/>
+          </a:prstGeom>
+        </p:spPr>
+      </p:pic>
+    </p:spTree>
+    <p:extLst>
+      <p:ext uri="{BB962C8B-B14F-4D97-AF65-F5344CB8AC3E}">
+        <p14:creationId xmlns:p14="http://schemas.microsoft.com/office/powerpoint/2010/main" val="981701135"/>
+      </p:ext>
+    </p:extLst>
+  </p:cSld>
+  <p:clrMapOvr>
+    <a:masterClrMapping/>
+  </p:clrMapOvr>
+  <p:timing>
+    <p:tnLst>
+      <p:par>
+        <p:cTn id="1" dur="indefinite" restart="never" nodeType="tmRoot"/>
+      </p:par>
+    </p:tnLst>
+  </p:timing>
+</p:sld>
+</file>
+
+<file path=ppt/slides/slide3.xml><?xml version="1.0" encoding="utf-8"?>
+<p:sld xmlns:a="http://schemas.openxmlformats.org/drawingml/2006/main" xmlns:r="http://schemas.openxmlformats.org/officeDocument/2006/relationships" xmlns:p="http://schemas.openxmlformats.org/presentationml/2006/main">
+  <p:cSld>
+    <p:spTree>
+      <p:nvGrpSpPr>
+        <p:cNvPr id="1" name=""/>
+        <p:cNvGrpSpPr/>
+        <p:nvPr/>
+      </p:nvGrpSpPr>
+      <p:grpSpPr>
+        <a:xfrm>
+          <a:off x="0" y="0"/>
+          <a:ext cx="0" cy="0"/>
+          <a:chOff x="0" y="0"/>
+          <a:chExt cx="0" cy="0"/>
+        </a:xfrm>
+      </p:grpSpPr>
+      <p:pic>
+        <p:nvPicPr>
+          <p:cNvPr id="6" name="Picture 5"/>
+          <p:cNvPicPr>
+            <a:picLocks noChangeAspect="1"/>
+          </p:cNvPicPr>
+          <p:nvPr/>
+        </p:nvPicPr>
+        <p:blipFill>
+          <a:blip r:embed="rId2"/>
+          <a:stretch>
+            <a:fillRect/>
+          </a:stretch>
+        </p:blipFill>
+        <p:spPr>
+          <a:xfrm>
+            <a:off x="105721" y="986135"/>
+            <a:ext cx="5943600" cy="4460663"/>
+          </a:xfrm>
+          <a:prstGeom prst="rect">
+            <a:avLst/>
+          </a:prstGeom>
+        </p:spPr>
+      </p:pic>
+      <p:pic>
+        <p:nvPicPr>
+          <p:cNvPr id="7" name="Picture 6"/>
+          <p:cNvPicPr>
+            <a:picLocks noChangeAspect="1"/>
+          </p:cNvPicPr>
+          <p:nvPr/>
+        </p:nvPicPr>
+        <p:blipFill>
+          <a:blip r:embed="rId3"/>
+          <a:stretch>
+            <a:fillRect/>
+          </a:stretch>
+        </p:blipFill>
+        <p:spPr>
+          <a:xfrm>
+            <a:off x="6248400" y="986134"/>
+            <a:ext cx="5943600" cy="4460663"/>
+          </a:xfrm>
+          <a:prstGeom prst="rect">
+            <a:avLst/>
+          </a:prstGeom>
+        </p:spPr>
+      </p:pic>
+      <p:sp>
+        <p:nvSpPr>
+          <p:cNvPr id="8" name="Title 7"/>
+          <p:cNvSpPr>
+            <a:spLocks noGrp="1"/>
+          </p:cNvSpPr>
+          <p:nvPr>
+            <p:ph type="title"/>
+          </p:nvPr>
+        </p:nvSpPr>
+        <p:spPr/>
+        <p:txBody>
+          <a:bodyPr/>
+          <a:lstStyle/>
+          <a:p>
+            <a:r>
+              <a:rPr lang="en-US" altLang="zh-TW" dirty="0" smtClean="0"/>
+              <a:t>Two power plants; both are committed</a:t>
+            </a:r>
+            <a:endParaRPr lang="zh-TW" altLang="en-US" dirty="0"/>
+          </a:p>
+        </p:txBody>
+      </p:sp>
+    </p:spTree>
+    <p:extLst>
+      <p:ext uri="{BB962C8B-B14F-4D97-AF65-F5344CB8AC3E}">
+        <p14:creationId xmlns:p14="http://schemas.microsoft.com/office/powerpoint/2010/main" val="3743150844"/>
+      </p:ext>
+    </p:extLst>
+  </p:cSld>
+  <p:clrMapOvr>
+    <a:masterClrMapping/>
+  </p:clrMapOvr>
+  <p:timing>
+    <p:tnLst>
+      <p:par>
+        <p:cTn id="1" dur="indefinite" restart="never" nodeType="tmRoot"/>
+      </p:par>
+    </p:tnLst>
+  </p:timing>
+</p:sld>
+</file>
+
+<file path=ppt/slides/slide4.xml><?xml version="1.0" encoding="utf-8"?>
+<p:sld xmlns:a="http://schemas.openxmlformats.org/drawingml/2006/main" xmlns:r="http://schemas.openxmlformats.org/officeDocument/2006/relationships" xmlns:p="http://schemas.openxmlformats.org/presentationml/2006/main">
+  <p:cSld>
+    <p:spTree>
+      <p:nvGrpSpPr>
+        <p:cNvPr id="1" name=""/>
+        <p:cNvGrpSpPr/>
+        <p:nvPr/>
+      </p:nvGrpSpPr>
+      <p:grpSpPr>
+        <a:xfrm>
+          <a:off x="0" y="0"/>
+          <a:ext cx="0" cy="0"/>
+          <a:chOff x="0" y="0"/>
+          <a:chExt cx="0" cy="0"/>
+        </a:xfrm>
+      </p:grpSpPr>
+      <p:sp>
+        <p:nvSpPr>
+          <p:cNvPr id="2" name="Title 1"/>
+          <p:cNvSpPr>
+            <a:spLocks noGrp="1"/>
+          </p:cNvSpPr>
+          <p:nvPr>
+            <p:ph type="title"/>
+          </p:nvPr>
+        </p:nvSpPr>
+        <p:spPr/>
+        <p:txBody>
+          <a:bodyPr/>
+          <a:lstStyle/>
+          <a:p>
+            <a:endParaRPr lang="zh-TW" altLang="en-US"/>
+          </a:p>
+        </p:txBody>
+      </p:sp>
+    </p:spTree>
+    <p:extLst>
+      <p:ext uri="{BB962C8B-B14F-4D97-AF65-F5344CB8AC3E}">
+        <p14:creationId xmlns:p14="http://schemas.microsoft.com/office/powerpoint/2010/main" val="2608073209"/>
+      </p:ext>
+    </p:extLst>
+  </p:cSld>
+  <p:clrMapOvr>
+    <a:masterClrMapping/>
+  </p:clrMapOvr>
+</p:sld>
+</file>
+
 <file path=ppt/theme/theme1.xml><?xml version="1.0" encoding="utf-8"?>
 <a:theme xmlns:a="http://schemas.openxmlformats.org/drawingml/2006/main" name="Office Theme">
   <a:themeElements>

</xml_diff>

<commit_message>
clean solution for 2 units
</commit_message>
<xml_diff>
--- a/Presentation1.pptx
+++ b/Presentation1.pptx
@@ -13,6 +13,8 @@
     <p:sldId id="260" r:id="rId7"/>
     <p:sldId id="261" r:id="rId8"/>
     <p:sldId id="264" r:id="rId9"/>
+    <p:sldId id="265" r:id="rId10"/>
+    <p:sldId id="266" r:id="rId11"/>
   </p:sldIdLst>
   <p:sldSz cx="12192000" cy="6858000"/>
   <p:notesSz cx="7315200" cy="9601200"/>
@@ -250,7 +252,7 @@
           <a:p>
             <a:fld id="{D638DB22-397D-48F1-BDCF-E66CBFA46A5C}" type="datetimeFigureOut">
               <a:rPr lang="zh-TW" altLang="en-US" smtClean="0"/>
-              <a:t>2015/11/13</a:t>
+              <a:t>2015/11/17</a:t>
             </a:fld>
             <a:endParaRPr lang="zh-TW" altLang="en-US"/>
           </a:p>
@@ -420,7 +422,7 @@
           <a:p>
             <a:fld id="{D638DB22-397D-48F1-BDCF-E66CBFA46A5C}" type="datetimeFigureOut">
               <a:rPr lang="zh-TW" altLang="en-US" smtClean="0"/>
-              <a:t>2015/11/13</a:t>
+              <a:t>2015/11/17</a:t>
             </a:fld>
             <a:endParaRPr lang="zh-TW" altLang="en-US"/>
           </a:p>
@@ -600,7 +602,7 @@
           <a:p>
             <a:fld id="{D638DB22-397D-48F1-BDCF-E66CBFA46A5C}" type="datetimeFigureOut">
               <a:rPr lang="zh-TW" altLang="en-US" smtClean="0"/>
-              <a:t>2015/11/13</a:t>
+              <a:t>2015/11/17</a:t>
             </a:fld>
             <a:endParaRPr lang="zh-TW" altLang="en-US"/>
           </a:p>
@@ -770,7 +772,7 @@
           <a:p>
             <a:fld id="{D638DB22-397D-48F1-BDCF-E66CBFA46A5C}" type="datetimeFigureOut">
               <a:rPr lang="zh-TW" altLang="en-US" smtClean="0"/>
-              <a:t>2015/11/13</a:t>
+              <a:t>2015/11/17</a:t>
             </a:fld>
             <a:endParaRPr lang="zh-TW" altLang="en-US"/>
           </a:p>
@@ -1016,7 +1018,7 @@
           <a:p>
             <a:fld id="{D638DB22-397D-48F1-BDCF-E66CBFA46A5C}" type="datetimeFigureOut">
               <a:rPr lang="zh-TW" altLang="en-US" smtClean="0"/>
-              <a:t>2015/11/13</a:t>
+              <a:t>2015/11/17</a:t>
             </a:fld>
             <a:endParaRPr lang="zh-TW" altLang="en-US"/>
           </a:p>
@@ -1248,7 +1250,7 @@
           <a:p>
             <a:fld id="{D638DB22-397D-48F1-BDCF-E66CBFA46A5C}" type="datetimeFigureOut">
               <a:rPr lang="zh-TW" altLang="en-US" smtClean="0"/>
-              <a:t>2015/11/13</a:t>
+              <a:t>2015/11/17</a:t>
             </a:fld>
             <a:endParaRPr lang="zh-TW" altLang="en-US"/>
           </a:p>
@@ -1615,7 +1617,7 @@
           <a:p>
             <a:fld id="{D638DB22-397D-48F1-BDCF-E66CBFA46A5C}" type="datetimeFigureOut">
               <a:rPr lang="zh-TW" altLang="en-US" smtClean="0"/>
-              <a:t>2015/11/13</a:t>
+              <a:t>2015/11/17</a:t>
             </a:fld>
             <a:endParaRPr lang="zh-TW" altLang="en-US"/>
           </a:p>
@@ -1733,7 +1735,7 @@
           <a:p>
             <a:fld id="{D638DB22-397D-48F1-BDCF-E66CBFA46A5C}" type="datetimeFigureOut">
               <a:rPr lang="zh-TW" altLang="en-US" smtClean="0"/>
-              <a:t>2015/11/13</a:t>
+              <a:t>2015/11/17</a:t>
             </a:fld>
             <a:endParaRPr lang="zh-TW" altLang="en-US"/>
           </a:p>
@@ -1828,7 +1830,7 @@
           <a:p>
             <a:fld id="{D638DB22-397D-48F1-BDCF-E66CBFA46A5C}" type="datetimeFigureOut">
               <a:rPr lang="zh-TW" altLang="en-US" smtClean="0"/>
-              <a:t>2015/11/13</a:t>
+              <a:t>2015/11/17</a:t>
             </a:fld>
             <a:endParaRPr lang="zh-TW" altLang="en-US"/>
           </a:p>
@@ -2105,7 +2107,7 @@
           <a:p>
             <a:fld id="{D638DB22-397D-48F1-BDCF-E66CBFA46A5C}" type="datetimeFigureOut">
               <a:rPr lang="zh-TW" altLang="en-US" smtClean="0"/>
-              <a:t>2015/11/13</a:t>
+              <a:t>2015/11/17</a:t>
             </a:fld>
             <a:endParaRPr lang="zh-TW" altLang="en-US"/>
           </a:p>
@@ -2358,7 +2360,7 @@
           <a:p>
             <a:fld id="{D638DB22-397D-48F1-BDCF-E66CBFA46A5C}" type="datetimeFigureOut">
               <a:rPr lang="zh-TW" altLang="en-US" smtClean="0"/>
-              <a:t>2015/11/13</a:t>
+              <a:t>2015/11/17</a:t>
             </a:fld>
             <a:endParaRPr lang="zh-TW" altLang="en-US"/>
           </a:p>
@@ -2571,7 +2573,7 @@
           <a:p>
             <a:fld id="{D638DB22-397D-48F1-BDCF-E66CBFA46A5C}" type="datetimeFigureOut">
               <a:rPr lang="zh-TW" altLang="en-US" smtClean="0"/>
-              <a:t>2015/11/13</a:t>
+              <a:t>2015/11/17</a:t>
             </a:fld>
             <a:endParaRPr lang="zh-TW" altLang="en-US"/>
           </a:p>
@@ -3044,6 +3046,108 @@
 </p:sld>
 </file>
 
+<file path=ppt/slides/slide10.xml><?xml version="1.0" encoding="utf-8"?>
+<p:sld xmlns:a="http://schemas.openxmlformats.org/drawingml/2006/main" xmlns:r="http://schemas.openxmlformats.org/officeDocument/2006/relationships" xmlns:p="http://schemas.openxmlformats.org/presentationml/2006/main">
+  <p:cSld>
+    <p:spTree>
+      <p:nvGrpSpPr>
+        <p:cNvPr id="1" name=""/>
+        <p:cNvGrpSpPr/>
+        <p:nvPr/>
+      </p:nvGrpSpPr>
+      <p:grpSpPr>
+        <a:xfrm>
+          <a:off x="0" y="0"/>
+          <a:ext cx="0" cy="0"/>
+          <a:chOff x="0" y="0"/>
+          <a:chExt cx="0" cy="0"/>
+        </a:xfrm>
+      </p:grpSpPr>
+      <p:pic>
+        <p:nvPicPr>
+          <p:cNvPr id="2" name="Picture 1"/>
+          <p:cNvPicPr>
+            <a:picLocks noChangeAspect="1"/>
+          </p:cNvPicPr>
+          <p:nvPr/>
+        </p:nvPicPr>
+        <p:blipFill>
+          <a:blip r:embed="rId2"/>
+          <a:stretch>
+            <a:fillRect/>
+          </a:stretch>
+        </p:blipFill>
+        <p:spPr>
+          <a:xfrm>
+            <a:off x="8132239" y="0"/>
+            <a:ext cx="4050456" cy="6858000"/>
+          </a:xfrm>
+          <a:prstGeom prst="rect">
+            <a:avLst/>
+          </a:prstGeom>
+        </p:spPr>
+      </p:pic>
+      <p:pic>
+        <p:nvPicPr>
+          <p:cNvPr id="4" name="Picture 3"/>
+          <p:cNvPicPr>
+            <a:picLocks noChangeAspect="1"/>
+          </p:cNvPicPr>
+          <p:nvPr/>
+        </p:nvPicPr>
+        <p:blipFill>
+          <a:blip r:embed="rId3"/>
+          <a:stretch>
+            <a:fillRect/>
+          </a:stretch>
+        </p:blipFill>
+        <p:spPr>
+          <a:xfrm>
+            <a:off x="1" y="1"/>
+            <a:ext cx="4050456" cy="6858000"/>
+          </a:xfrm>
+          <a:prstGeom prst="rect">
+            <a:avLst/>
+          </a:prstGeom>
+        </p:spPr>
+      </p:pic>
+      <p:pic>
+        <p:nvPicPr>
+          <p:cNvPr id="5" name="Picture 4"/>
+          <p:cNvPicPr>
+            <a:picLocks noChangeAspect="1"/>
+          </p:cNvPicPr>
+          <p:nvPr/>
+        </p:nvPicPr>
+        <p:blipFill>
+          <a:blip r:embed="rId4"/>
+          <a:stretch>
+            <a:fillRect/>
+          </a:stretch>
+        </p:blipFill>
+        <p:spPr>
+          <a:xfrm>
+            <a:off x="4050457" y="0"/>
+            <a:ext cx="4050456" cy="6858000"/>
+          </a:xfrm>
+          <a:prstGeom prst="rect">
+            <a:avLst/>
+          </a:prstGeom>
+        </p:spPr>
+      </p:pic>
+    </p:spTree>
+    <p:extLst>
+      <p:ext uri="{BB962C8B-B14F-4D97-AF65-F5344CB8AC3E}">
+        <p14:creationId xmlns:p14="http://schemas.microsoft.com/office/powerpoint/2010/main" val="1297608120"/>
+      </p:ext>
+    </p:extLst>
+  </p:cSld>
+  <p:clrMapOvr>
+    <a:masterClrMapping/>
+  </p:clrMapOvr>
+</p:sld>
+</file>
+
 <file path=ppt/slides/slide2.xml><?xml version="1.0" encoding="utf-8"?>
 <p:sld xmlns:a="http://schemas.openxmlformats.org/drawingml/2006/main" xmlns:r="http://schemas.openxmlformats.org/officeDocument/2006/relationships" xmlns:p="http://schemas.openxmlformats.org/presentationml/2006/main">
   <p:cSld>
@@ -4093,11 +4197,7 @@
             <a:pPr algn="ctr"/>
             <a:r>
               <a:rPr lang="en-US" altLang="zh-TW" dirty="0" smtClean="0"/>
-              <a:t>Solution quality is not better with finer </a:t>
-            </a:r>
-            <a:r>
-              <a:rPr lang="en-US" altLang="zh-TW" dirty="0" smtClean="0"/>
-              <a:t>grid:(</a:t>
+              <a:t>Solution quality is not better with finer grid:(</a:t>
             </a:r>
             <a:endParaRPr lang="zh-TW" altLang="en-US" dirty="0"/>
           </a:p>
@@ -4240,6 +4340,60 @@
     <p:extLst>
       <p:ext uri="{BB962C8B-B14F-4D97-AF65-F5344CB8AC3E}">
         <p14:creationId xmlns:p14="http://schemas.microsoft.com/office/powerpoint/2010/main" val="4072812127"/>
+      </p:ext>
+    </p:extLst>
+  </p:cSld>
+  <p:clrMapOvr>
+    <a:masterClrMapping/>
+  </p:clrMapOvr>
+</p:sld>
+</file>
+
+<file path=ppt/slides/slide9.xml><?xml version="1.0" encoding="utf-8"?>
+<p:sld xmlns:a="http://schemas.openxmlformats.org/drawingml/2006/main" xmlns:r="http://schemas.openxmlformats.org/officeDocument/2006/relationships" xmlns:p="http://schemas.openxmlformats.org/presentationml/2006/main">
+  <p:cSld>
+    <p:spTree>
+      <p:nvGrpSpPr>
+        <p:cNvPr id="1" name=""/>
+        <p:cNvGrpSpPr/>
+        <p:nvPr/>
+      </p:nvGrpSpPr>
+      <p:grpSpPr>
+        <a:xfrm>
+          <a:off x="0" y="0"/>
+          <a:ext cx="0" cy="0"/>
+          <a:chOff x="0" y="0"/>
+          <a:chExt cx="0" cy="0"/>
+        </a:xfrm>
+      </p:grpSpPr>
+      <p:pic>
+        <p:nvPicPr>
+          <p:cNvPr id="2" name="Picture 1"/>
+          <p:cNvPicPr>
+            <a:picLocks noChangeAspect="1"/>
+          </p:cNvPicPr>
+          <p:nvPr/>
+        </p:nvPicPr>
+        <p:blipFill>
+          <a:blip r:embed="rId2"/>
+          <a:stretch>
+            <a:fillRect/>
+          </a:stretch>
+        </p:blipFill>
+        <p:spPr>
+          <a:xfrm>
+            <a:off x="1927224" y="0"/>
+            <a:ext cx="9140518" cy="6858000"/>
+          </a:xfrm>
+          <a:prstGeom prst="rect">
+            <a:avLst/>
+          </a:prstGeom>
+        </p:spPr>
+      </p:pic>
+    </p:spTree>
+    <p:extLst>
+      <p:ext uri="{BB962C8B-B14F-4D97-AF65-F5344CB8AC3E}">
+        <p14:creationId xmlns:p14="http://schemas.microsoft.com/office/powerpoint/2010/main" val="3232639814"/>
       </p:ext>
     </p:extLst>
   </p:cSld>

</xml_diff>

<commit_message>
clean solution for 5 units
</commit_message>
<xml_diff>
--- a/Presentation1.pptx
+++ b/Presentation1.pptx
@@ -15,6 +15,8 @@
     <p:sldId id="264" r:id="rId9"/>
     <p:sldId id="265" r:id="rId10"/>
     <p:sldId id="266" r:id="rId11"/>
+    <p:sldId id="267" r:id="rId12"/>
+    <p:sldId id="268" r:id="rId13"/>
   </p:sldIdLst>
   <p:sldSz cx="12192000" cy="6858000"/>
   <p:notesSz cx="7315200" cy="9601200"/>
@@ -3079,7 +3081,7 @@
         </p:blipFill>
         <p:spPr>
           <a:xfrm>
-            <a:off x="8132239" y="0"/>
+            <a:off x="8141544" y="0"/>
             <a:ext cx="4050456" cy="6858000"/>
           </a:xfrm>
           <a:prstGeom prst="rect">
@@ -3139,6 +3141,176 @@
     <p:extLst>
       <p:ext uri="{BB962C8B-B14F-4D97-AF65-F5344CB8AC3E}">
         <p14:creationId xmlns:p14="http://schemas.microsoft.com/office/powerpoint/2010/main" val="1297608120"/>
+      </p:ext>
+    </p:extLst>
+  </p:cSld>
+  <p:clrMapOvr>
+    <a:masterClrMapping/>
+  </p:clrMapOvr>
+  <p:timing>
+    <p:tnLst>
+      <p:par>
+        <p:cTn id="1" dur="indefinite" restart="never" nodeType="tmRoot"/>
+      </p:par>
+    </p:tnLst>
+  </p:timing>
+</p:sld>
+</file>
+
+<file path=ppt/slides/slide11.xml><?xml version="1.0" encoding="utf-8"?>
+<p:sld xmlns:a="http://schemas.openxmlformats.org/drawingml/2006/main" xmlns:r="http://schemas.openxmlformats.org/officeDocument/2006/relationships" xmlns:p="http://schemas.openxmlformats.org/presentationml/2006/main">
+  <p:cSld>
+    <p:spTree>
+      <p:nvGrpSpPr>
+        <p:cNvPr id="1" name=""/>
+        <p:cNvGrpSpPr/>
+        <p:nvPr/>
+      </p:nvGrpSpPr>
+      <p:grpSpPr>
+        <a:xfrm>
+          <a:off x="0" y="0"/>
+          <a:ext cx="0" cy="0"/>
+          <a:chOff x="0" y="0"/>
+          <a:chExt cx="0" cy="0"/>
+        </a:xfrm>
+      </p:grpSpPr>
+      <p:pic>
+        <p:nvPicPr>
+          <p:cNvPr id="6" name="Picture 5"/>
+          <p:cNvPicPr>
+            <a:picLocks noChangeAspect="1"/>
+          </p:cNvPicPr>
+          <p:nvPr/>
+        </p:nvPicPr>
+        <p:blipFill>
+          <a:blip r:embed="rId2"/>
+          <a:stretch>
+            <a:fillRect/>
+          </a:stretch>
+        </p:blipFill>
+        <p:spPr>
+          <a:xfrm>
+            <a:off x="0" y="0"/>
+            <a:ext cx="4050455" cy="6858000"/>
+          </a:xfrm>
+          <a:prstGeom prst="rect">
+            <a:avLst/>
+          </a:prstGeom>
+        </p:spPr>
+      </p:pic>
+      <p:pic>
+        <p:nvPicPr>
+          <p:cNvPr id="7" name="Picture 6"/>
+          <p:cNvPicPr>
+            <a:picLocks noChangeAspect="1"/>
+          </p:cNvPicPr>
+          <p:nvPr/>
+        </p:nvPicPr>
+        <p:blipFill>
+          <a:blip r:embed="rId3"/>
+          <a:stretch>
+            <a:fillRect/>
+          </a:stretch>
+        </p:blipFill>
+        <p:spPr>
+          <a:xfrm>
+            <a:off x="4050455" y="0"/>
+            <a:ext cx="4050456" cy="6858000"/>
+          </a:xfrm>
+          <a:prstGeom prst="rect">
+            <a:avLst/>
+          </a:prstGeom>
+        </p:spPr>
+      </p:pic>
+      <p:pic>
+        <p:nvPicPr>
+          <p:cNvPr id="8" name="Picture 7"/>
+          <p:cNvPicPr>
+            <a:picLocks noChangeAspect="1"/>
+          </p:cNvPicPr>
+          <p:nvPr/>
+        </p:nvPicPr>
+        <p:blipFill>
+          <a:blip r:embed="rId4"/>
+          <a:stretch>
+            <a:fillRect/>
+          </a:stretch>
+        </p:blipFill>
+        <p:spPr>
+          <a:xfrm>
+            <a:off x="8141544" y="0"/>
+            <a:ext cx="4050456" cy="6858000"/>
+          </a:xfrm>
+          <a:prstGeom prst="rect">
+            <a:avLst/>
+          </a:prstGeom>
+        </p:spPr>
+      </p:pic>
+    </p:spTree>
+    <p:extLst>
+      <p:ext uri="{BB962C8B-B14F-4D97-AF65-F5344CB8AC3E}">
+        <p14:creationId xmlns:p14="http://schemas.microsoft.com/office/powerpoint/2010/main" val="1797951285"/>
+      </p:ext>
+    </p:extLst>
+  </p:cSld>
+  <p:clrMapOvr>
+    <a:masterClrMapping/>
+  </p:clrMapOvr>
+  <p:timing>
+    <p:tnLst>
+      <p:par>
+        <p:cTn id="1" dur="indefinite" restart="never" nodeType="tmRoot"/>
+      </p:par>
+    </p:tnLst>
+  </p:timing>
+</p:sld>
+</file>
+
+<file path=ppt/slides/slide12.xml><?xml version="1.0" encoding="utf-8"?>
+<p:sld xmlns:a="http://schemas.openxmlformats.org/drawingml/2006/main" xmlns:r="http://schemas.openxmlformats.org/officeDocument/2006/relationships" xmlns:p="http://schemas.openxmlformats.org/presentationml/2006/main">
+  <p:cSld>
+    <p:spTree>
+      <p:nvGrpSpPr>
+        <p:cNvPr id="1" name=""/>
+        <p:cNvGrpSpPr/>
+        <p:nvPr/>
+      </p:nvGrpSpPr>
+      <p:grpSpPr>
+        <a:xfrm>
+          <a:off x="0" y="0"/>
+          <a:ext cx="0" cy="0"/>
+          <a:chOff x="0" y="0"/>
+          <a:chExt cx="0" cy="0"/>
+        </a:xfrm>
+      </p:grpSpPr>
+      <p:pic>
+        <p:nvPicPr>
+          <p:cNvPr id="3" name="Picture 2"/>
+          <p:cNvPicPr>
+            <a:picLocks noChangeAspect="1"/>
+          </p:cNvPicPr>
+          <p:nvPr/>
+        </p:nvPicPr>
+        <p:blipFill>
+          <a:blip r:embed="rId2"/>
+          <a:stretch>
+            <a:fillRect/>
+          </a:stretch>
+        </p:blipFill>
+        <p:spPr>
+          <a:xfrm>
+            <a:off x="0" y="0"/>
+            <a:ext cx="4050456" cy="6858000"/>
+          </a:xfrm>
+          <a:prstGeom prst="rect">
+            <a:avLst/>
+          </a:prstGeom>
+        </p:spPr>
+      </p:pic>
+    </p:spTree>
+    <p:extLst>
+      <p:ext uri="{BB962C8B-B14F-4D97-AF65-F5344CB8AC3E}">
+        <p14:creationId xmlns:p14="http://schemas.microsoft.com/office/powerpoint/2010/main" val="177625073"/>
       </p:ext>
     </p:extLst>
   </p:cSld>
@@ -4400,6 +4572,13 @@
   <p:clrMapOvr>
     <a:masterClrMapping/>
   </p:clrMapOvr>
+  <p:timing>
+    <p:tnLst>
+      <p:par>
+        <p:cTn id="1" dur="indefinite" restart="never" nodeType="tmRoot"/>
+      </p:par>
+    </p:tnLst>
+  </p:timing>
 </p:sld>
 </file>
 

</xml_diff>

<commit_message>
clean solution w/ loop
</commit_message>
<xml_diff>
--- a/Presentation1.pptx
+++ b/Presentation1.pptx
@@ -11,12 +11,13 @@
     <p:sldId id="263" r:id="rId5"/>
     <p:sldId id="259" r:id="rId6"/>
     <p:sldId id="260" r:id="rId7"/>
-    <p:sldId id="261" r:id="rId8"/>
-    <p:sldId id="264" r:id="rId9"/>
-    <p:sldId id="265" r:id="rId10"/>
+    <p:sldId id="269" r:id="rId8"/>
+    <p:sldId id="261" r:id="rId9"/>
+    <p:sldId id="264" r:id="rId10"/>
     <p:sldId id="266" r:id="rId11"/>
-    <p:sldId id="267" r:id="rId12"/>
-    <p:sldId id="268" r:id="rId13"/>
+    <p:sldId id="265" r:id="rId12"/>
+    <p:sldId id="267" r:id="rId13"/>
+    <p:sldId id="268" r:id="rId14"/>
   </p:sldIdLst>
   <p:sldSz cx="12192000" cy="6858000"/>
   <p:notesSz cx="7315200" cy="9601200"/>
@@ -254,7 +255,7 @@
           <a:p>
             <a:fld id="{D638DB22-397D-48F1-BDCF-E66CBFA46A5C}" type="datetimeFigureOut">
               <a:rPr lang="zh-TW" altLang="en-US" smtClean="0"/>
-              <a:t>2015/11/17</a:t>
+              <a:t>2015/12/21</a:t>
             </a:fld>
             <a:endParaRPr lang="zh-TW" altLang="en-US"/>
           </a:p>
@@ -424,7 +425,7 @@
           <a:p>
             <a:fld id="{D638DB22-397D-48F1-BDCF-E66CBFA46A5C}" type="datetimeFigureOut">
               <a:rPr lang="zh-TW" altLang="en-US" smtClean="0"/>
-              <a:t>2015/11/17</a:t>
+              <a:t>2015/12/21</a:t>
             </a:fld>
             <a:endParaRPr lang="zh-TW" altLang="en-US"/>
           </a:p>
@@ -604,7 +605,7 @@
           <a:p>
             <a:fld id="{D638DB22-397D-48F1-BDCF-E66CBFA46A5C}" type="datetimeFigureOut">
               <a:rPr lang="zh-TW" altLang="en-US" smtClean="0"/>
-              <a:t>2015/11/17</a:t>
+              <a:t>2015/12/21</a:t>
             </a:fld>
             <a:endParaRPr lang="zh-TW" altLang="en-US"/>
           </a:p>
@@ -774,7 +775,7 @@
           <a:p>
             <a:fld id="{D638DB22-397D-48F1-BDCF-E66CBFA46A5C}" type="datetimeFigureOut">
               <a:rPr lang="zh-TW" altLang="en-US" smtClean="0"/>
-              <a:t>2015/11/17</a:t>
+              <a:t>2015/12/21</a:t>
             </a:fld>
             <a:endParaRPr lang="zh-TW" altLang="en-US"/>
           </a:p>
@@ -1020,7 +1021,7 @@
           <a:p>
             <a:fld id="{D638DB22-397D-48F1-BDCF-E66CBFA46A5C}" type="datetimeFigureOut">
               <a:rPr lang="zh-TW" altLang="en-US" smtClean="0"/>
-              <a:t>2015/11/17</a:t>
+              <a:t>2015/12/21</a:t>
             </a:fld>
             <a:endParaRPr lang="zh-TW" altLang="en-US"/>
           </a:p>
@@ -1252,7 +1253,7 @@
           <a:p>
             <a:fld id="{D638DB22-397D-48F1-BDCF-E66CBFA46A5C}" type="datetimeFigureOut">
               <a:rPr lang="zh-TW" altLang="en-US" smtClean="0"/>
-              <a:t>2015/11/17</a:t>
+              <a:t>2015/12/21</a:t>
             </a:fld>
             <a:endParaRPr lang="zh-TW" altLang="en-US"/>
           </a:p>
@@ -1619,7 +1620,7 @@
           <a:p>
             <a:fld id="{D638DB22-397D-48F1-BDCF-E66CBFA46A5C}" type="datetimeFigureOut">
               <a:rPr lang="zh-TW" altLang="en-US" smtClean="0"/>
-              <a:t>2015/11/17</a:t>
+              <a:t>2015/12/21</a:t>
             </a:fld>
             <a:endParaRPr lang="zh-TW" altLang="en-US"/>
           </a:p>
@@ -1737,7 +1738,7 @@
           <a:p>
             <a:fld id="{D638DB22-397D-48F1-BDCF-E66CBFA46A5C}" type="datetimeFigureOut">
               <a:rPr lang="zh-TW" altLang="en-US" smtClean="0"/>
-              <a:t>2015/11/17</a:t>
+              <a:t>2015/12/21</a:t>
             </a:fld>
             <a:endParaRPr lang="zh-TW" altLang="en-US"/>
           </a:p>
@@ -1832,7 +1833,7 @@
           <a:p>
             <a:fld id="{D638DB22-397D-48F1-BDCF-E66CBFA46A5C}" type="datetimeFigureOut">
               <a:rPr lang="zh-TW" altLang="en-US" smtClean="0"/>
-              <a:t>2015/11/17</a:t>
+              <a:t>2015/12/21</a:t>
             </a:fld>
             <a:endParaRPr lang="zh-TW" altLang="en-US"/>
           </a:p>
@@ -2109,7 +2110,7 @@
           <a:p>
             <a:fld id="{D638DB22-397D-48F1-BDCF-E66CBFA46A5C}" type="datetimeFigureOut">
               <a:rPr lang="zh-TW" altLang="en-US" smtClean="0"/>
-              <a:t>2015/11/17</a:t>
+              <a:t>2015/12/21</a:t>
             </a:fld>
             <a:endParaRPr lang="zh-TW" altLang="en-US"/>
           </a:p>
@@ -2362,7 +2363,7 @@
           <a:p>
             <a:fld id="{D638DB22-397D-48F1-BDCF-E66CBFA46A5C}" type="datetimeFigureOut">
               <a:rPr lang="zh-TW" altLang="en-US" smtClean="0"/>
-              <a:t>2015/11/17</a:t>
+              <a:t>2015/12/21</a:t>
             </a:fld>
             <a:endParaRPr lang="zh-TW" altLang="en-US"/>
           </a:p>
@@ -2575,7 +2576,7 @@
           <a:p>
             <a:fld id="{D638DB22-397D-48F1-BDCF-E66CBFA46A5C}" type="datetimeFigureOut">
               <a:rPr lang="zh-TW" altLang="en-US" smtClean="0"/>
-              <a:t>2015/11/17</a:t>
+              <a:t>2015/12/21</a:t>
             </a:fld>
             <a:endParaRPr lang="zh-TW" altLang="en-US"/>
           </a:p>
@@ -3176,7 +3177,7 @@
       </p:grpSpPr>
       <p:pic>
         <p:nvPicPr>
-          <p:cNvPr id="6" name="Picture 5"/>
+          <p:cNvPr id="2" name="Picture 1"/>
           <p:cNvPicPr>
             <a:picLocks noChangeAspect="1"/>
           </p:cNvPicPr>
@@ -3190,56 +3191,8 @@
         </p:blipFill>
         <p:spPr>
           <a:xfrm>
-            <a:off x="0" y="0"/>
-            <a:ext cx="4050455" cy="6858000"/>
-          </a:xfrm>
-          <a:prstGeom prst="rect">
-            <a:avLst/>
-          </a:prstGeom>
-        </p:spPr>
-      </p:pic>
-      <p:pic>
-        <p:nvPicPr>
-          <p:cNvPr id="7" name="Picture 6"/>
-          <p:cNvPicPr>
-            <a:picLocks noChangeAspect="1"/>
-          </p:cNvPicPr>
-          <p:nvPr/>
-        </p:nvPicPr>
-        <p:blipFill>
-          <a:blip r:embed="rId3"/>
-          <a:stretch>
-            <a:fillRect/>
-          </a:stretch>
-        </p:blipFill>
-        <p:spPr>
-          <a:xfrm>
-            <a:off x="4050455" y="0"/>
-            <a:ext cx="4050456" cy="6858000"/>
-          </a:xfrm>
-          <a:prstGeom prst="rect">
-            <a:avLst/>
-          </a:prstGeom>
-        </p:spPr>
-      </p:pic>
-      <p:pic>
-        <p:nvPicPr>
-          <p:cNvPr id="8" name="Picture 7"/>
-          <p:cNvPicPr>
-            <a:picLocks noChangeAspect="1"/>
-          </p:cNvPicPr>
-          <p:nvPr/>
-        </p:nvPicPr>
-        <p:blipFill>
-          <a:blip r:embed="rId4"/>
-          <a:stretch>
-            <a:fillRect/>
-          </a:stretch>
-        </p:blipFill>
-        <p:spPr>
-          <a:xfrm>
-            <a:off x="8141544" y="0"/>
-            <a:ext cx="4050456" cy="6858000"/>
+            <a:off x="1927224" y="0"/>
+            <a:ext cx="9140518" cy="6858000"/>
           </a:xfrm>
           <a:prstGeom prst="rect">
             <a:avLst/>
@@ -3249,7 +3202,7 @@
     </p:spTree>
     <p:extLst>
       <p:ext uri="{BB962C8B-B14F-4D97-AF65-F5344CB8AC3E}">
-        <p14:creationId xmlns:p14="http://schemas.microsoft.com/office/powerpoint/2010/main" val="1797951285"/>
+        <p14:creationId xmlns:p14="http://schemas.microsoft.com/office/powerpoint/2010/main" val="3232639814"/>
       </p:ext>
     </p:extLst>
   </p:cSld>
@@ -3285,7 +3238,7 @@
       </p:grpSpPr>
       <p:pic>
         <p:nvPicPr>
-          <p:cNvPr id="3" name="Picture 2"/>
+          <p:cNvPr id="6" name="Picture 5"/>
           <p:cNvPicPr>
             <a:picLocks noChangeAspect="1"/>
           </p:cNvPicPr>
@@ -3299,8 +3252,117 @@
         </p:blipFill>
         <p:spPr>
           <a:xfrm>
-            <a:off x="0" y="0"/>
-            <a:ext cx="4050456" cy="6858000"/>
+            <a:off x="419100" y="285750"/>
+            <a:ext cx="3712917" cy="6286500"/>
+          </a:xfrm>
+          <a:prstGeom prst="rect">
+            <a:avLst/>
+          </a:prstGeom>
+        </p:spPr>
+      </p:pic>
+      <p:pic>
+        <p:nvPicPr>
+          <p:cNvPr id="7" name="Picture 6"/>
+          <p:cNvPicPr>
+            <a:picLocks noChangeAspect="1"/>
+          </p:cNvPicPr>
+          <p:nvPr/>
+        </p:nvPicPr>
+        <p:blipFill>
+          <a:blip r:embed="rId3"/>
+          <a:stretch>
+            <a:fillRect/>
+          </a:stretch>
+        </p:blipFill>
+        <p:spPr>
+          <a:xfrm>
+            <a:off x="4141140" y="285750"/>
+            <a:ext cx="3712918" cy="6286500"/>
+          </a:xfrm>
+          <a:prstGeom prst="rect">
+            <a:avLst/>
+          </a:prstGeom>
+        </p:spPr>
+      </p:pic>
+      <p:pic>
+        <p:nvPicPr>
+          <p:cNvPr id="3" name="Picture 2"/>
+          <p:cNvPicPr>
+            <a:picLocks noChangeAspect="1"/>
+          </p:cNvPicPr>
+          <p:nvPr/>
+        </p:nvPicPr>
+        <p:blipFill>
+          <a:blip r:embed="rId4"/>
+          <a:stretch>
+            <a:fillRect/>
+          </a:stretch>
+        </p:blipFill>
+        <p:spPr>
+          <a:xfrm>
+            <a:off x="7863182" y="0"/>
+            <a:ext cx="4051823" cy="6858000"/>
+          </a:xfrm>
+          <a:prstGeom prst="rect">
+            <a:avLst/>
+          </a:prstGeom>
+        </p:spPr>
+      </p:pic>
+    </p:spTree>
+    <p:extLst>
+      <p:ext uri="{BB962C8B-B14F-4D97-AF65-F5344CB8AC3E}">
+        <p14:creationId xmlns:p14="http://schemas.microsoft.com/office/powerpoint/2010/main" val="1797951285"/>
+      </p:ext>
+    </p:extLst>
+  </p:cSld>
+  <p:clrMapOvr>
+    <a:masterClrMapping/>
+  </p:clrMapOvr>
+  <p:timing>
+    <p:tnLst>
+      <p:par>
+        <p:cTn id="1" dur="indefinite" restart="never" nodeType="tmRoot"/>
+      </p:par>
+    </p:tnLst>
+  </p:timing>
+</p:sld>
+</file>
+
+<file path=ppt/slides/slide13.xml><?xml version="1.0" encoding="utf-8"?>
+<p:sld xmlns:a="http://schemas.openxmlformats.org/drawingml/2006/main" xmlns:r="http://schemas.openxmlformats.org/officeDocument/2006/relationships" xmlns:p="http://schemas.openxmlformats.org/presentationml/2006/main">
+  <p:cSld>
+    <p:spTree>
+      <p:nvGrpSpPr>
+        <p:cNvPr id="1" name=""/>
+        <p:cNvGrpSpPr/>
+        <p:nvPr/>
+      </p:nvGrpSpPr>
+      <p:grpSpPr>
+        <a:xfrm>
+          <a:off x="0" y="0"/>
+          <a:ext cx="0" cy="0"/>
+          <a:chOff x="0" y="0"/>
+          <a:chExt cx="0" cy="0"/>
+        </a:xfrm>
+      </p:grpSpPr>
+      <p:pic>
+        <p:nvPicPr>
+          <p:cNvPr id="2" name="Picture 1"/>
+          <p:cNvPicPr>
+            <a:picLocks noChangeAspect="1"/>
+          </p:cNvPicPr>
+          <p:nvPr/>
+        </p:nvPicPr>
+        <p:blipFill>
+          <a:blip r:embed="rId2"/>
+          <a:stretch>
+            <a:fillRect/>
+          </a:stretch>
+        </p:blipFill>
+        <p:spPr>
+          <a:xfrm>
+            <a:off x="1928812" y="304800"/>
+            <a:ext cx="8334375" cy="6248400"/>
           </a:xfrm>
           <a:prstGeom prst="rect">
             <a:avLst/>
@@ -3567,6 +3629,36 @@
           </a:prstGeom>
         </p:spPr>
       </p:pic>
+      <p:sp>
+        <p:nvSpPr>
+          <p:cNvPr id="2" name="TextBox 1"/>
+          <p:cNvSpPr txBox="1"/>
+          <p:nvPr/>
+        </p:nvSpPr>
+        <p:spPr>
+          <a:xfrm>
+            <a:off x="0" y="0"/>
+            <a:ext cx="1953355" cy="584775"/>
+          </a:xfrm>
+          <a:prstGeom prst="rect">
+            <a:avLst/>
+          </a:prstGeom>
+          <a:noFill/>
+        </p:spPr>
+        <p:txBody>
+          <a:bodyPr wrap="none" rtlCol="0">
+            <a:spAutoFit/>
+          </a:bodyPr>
+          <a:lstStyle/>
+          <a:p>
+            <a:r>
+              <a:rPr lang="en-US" altLang="zh-TW" sz="3200" b="1" dirty="0" smtClean="0"/>
+              <a:t>Two units:</a:t>
+            </a:r>
+            <a:endParaRPr lang="zh-TW" altLang="en-US" sz="3200" b="1" dirty="0"/>
+          </a:p>
+        </p:txBody>
+      </p:sp>
     </p:spTree>
     <p:extLst>
       <p:ext uri="{BB962C8B-B14F-4D97-AF65-F5344CB8AC3E}">
@@ -4259,6 +4351,36 @@
           </a:p>
         </p:txBody>
       </p:sp>
+      <p:sp>
+        <p:nvSpPr>
+          <p:cNvPr id="13" name="TextBox 12"/>
+          <p:cNvSpPr txBox="1"/>
+          <p:nvPr/>
+        </p:nvSpPr>
+        <p:spPr>
+          <a:xfrm>
+            <a:off x="0" y="0"/>
+            <a:ext cx="1953355" cy="584775"/>
+          </a:xfrm>
+          <a:prstGeom prst="rect">
+            <a:avLst/>
+          </a:prstGeom>
+          <a:noFill/>
+        </p:spPr>
+        <p:txBody>
+          <a:bodyPr wrap="none" rtlCol="0">
+            <a:spAutoFit/>
+          </a:bodyPr>
+          <a:lstStyle/>
+          <a:p>
+            <a:r>
+              <a:rPr lang="en-US" altLang="zh-TW" sz="3200" b="1" dirty="0" smtClean="0"/>
+              <a:t>Two units:</a:t>
+            </a:r>
+            <a:endParaRPr lang="zh-TW" altLang="en-US" sz="3200" b="1" dirty="0"/>
+          </a:p>
+        </p:txBody>
+      </p:sp>
     </p:spTree>
     <p:extLst>
       <p:ext uri="{BB962C8B-B14F-4D97-AF65-F5344CB8AC3E}">
@@ -4296,9 +4418,39 @@
           <a:chExt cx="0" cy="0"/>
         </a:xfrm>
       </p:grpSpPr>
+      <p:sp>
+        <p:nvSpPr>
+          <p:cNvPr id="2" name="TextBox 1"/>
+          <p:cNvSpPr txBox="1"/>
+          <p:nvPr/>
+        </p:nvSpPr>
+        <p:spPr>
+          <a:xfrm>
+            <a:off x="0" y="0"/>
+            <a:ext cx="2215863" cy="584775"/>
+          </a:xfrm>
+          <a:prstGeom prst="rect">
+            <a:avLst/>
+          </a:prstGeom>
+          <a:noFill/>
+        </p:spPr>
+        <p:txBody>
+          <a:bodyPr wrap="none" rtlCol="0">
+            <a:spAutoFit/>
+          </a:bodyPr>
+          <a:lstStyle/>
+          <a:p>
+            <a:r>
+              <a:rPr lang="en-US" altLang="zh-TW" sz="3200" b="1" dirty="0" smtClean="0"/>
+              <a:t>Three units:</a:t>
+            </a:r>
+            <a:endParaRPr lang="zh-TW" altLang="en-US" sz="3200" b="1" dirty="0"/>
+          </a:p>
+        </p:txBody>
+      </p:sp>
       <p:pic>
         <p:nvPicPr>
-          <p:cNvPr id="8" name="Picture 7"/>
+          <p:cNvPr id="3" name="Picture 2"/>
           <p:cNvPicPr>
             <a:picLocks noChangeAspect="1"/>
           </p:cNvPicPr>
@@ -4312,86 +4464,24 @@
         </p:blipFill>
         <p:spPr>
           <a:xfrm>
-            <a:off x="1513114" y="1411006"/>
-            <a:ext cx="4572000" cy="3430306"/>
+            <a:off x="1554162" y="455083"/>
+            <a:ext cx="8334375" cy="6248400"/>
           </a:xfrm>
           <a:prstGeom prst="rect">
             <a:avLst/>
           </a:prstGeom>
         </p:spPr>
       </p:pic>
-      <p:pic>
-        <p:nvPicPr>
-          <p:cNvPr id="7" name="Picture 6"/>
-          <p:cNvPicPr>
-            <a:picLocks noChangeAspect="1"/>
-          </p:cNvPicPr>
-          <p:nvPr/>
-        </p:nvPicPr>
-        <p:blipFill>
-          <a:blip r:embed="rId3"/>
-          <a:stretch>
-            <a:fillRect/>
-          </a:stretch>
-        </p:blipFill>
-        <p:spPr>
-          <a:xfrm>
-            <a:off x="6353175" y="1408394"/>
-            <a:ext cx="4572000" cy="3430306"/>
-          </a:xfrm>
-          <a:prstGeom prst="rect">
-            <a:avLst/>
-          </a:prstGeom>
-        </p:spPr>
-      </p:pic>
-      <p:sp>
-        <p:nvSpPr>
-          <p:cNvPr id="6" name="TextBox 5"/>
-          <p:cNvSpPr txBox="1"/>
-          <p:nvPr/>
-        </p:nvSpPr>
-        <p:spPr>
-          <a:xfrm>
-            <a:off x="7129534" y="4838700"/>
-            <a:ext cx="3152632" cy="646331"/>
-          </a:xfrm>
-          <a:prstGeom prst="rect">
-            <a:avLst/>
-          </a:prstGeom>
-          <a:noFill/>
-        </p:spPr>
-        <p:txBody>
-          <a:bodyPr wrap="square" rtlCol="0">
-            <a:spAutoFit/>
-          </a:bodyPr>
-          <a:lstStyle/>
-          <a:p>
-            <a:pPr algn="ctr"/>
-            <a:r>
-              <a:rPr lang="en-US" altLang="zh-TW" dirty="0" smtClean="0"/>
-              <a:t>Solution quality is not better with finer grid:(</a:t>
-            </a:r>
-            <a:endParaRPr lang="zh-TW" altLang="en-US" dirty="0"/>
-          </a:p>
-        </p:txBody>
-      </p:sp>
     </p:spTree>
     <p:extLst>
       <p:ext uri="{BB962C8B-B14F-4D97-AF65-F5344CB8AC3E}">
-        <p14:creationId xmlns:p14="http://schemas.microsoft.com/office/powerpoint/2010/main" val="2687857575"/>
+        <p14:creationId xmlns:p14="http://schemas.microsoft.com/office/powerpoint/2010/main" val="4116339452"/>
       </p:ext>
     </p:extLst>
   </p:cSld>
   <p:clrMapOvr>
     <a:masterClrMapping/>
   </p:clrMapOvr>
-  <p:timing>
-    <p:tnLst>
-      <p:par>
-        <p:cTn id="1" dur="indefinite" restart="never" nodeType="tmRoot"/>
-      </p:par>
-    </p:tnLst>
-  </p:timing>
 </p:sld>
 </file>
 
@@ -4414,7 +4504,7 @@
       </p:grpSpPr>
       <p:pic>
         <p:nvPicPr>
-          <p:cNvPr id="2" name="Picture 1"/>
+          <p:cNvPr id="8" name="Picture 7"/>
           <p:cNvPicPr>
             <a:picLocks noChangeAspect="1"/>
           </p:cNvPicPr>
@@ -4428,7 +4518,7 @@
         </p:blipFill>
         <p:spPr>
           <a:xfrm>
-            <a:off x="1628407" y="0"/>
+            <a:off x="1513114" y="1411006"/>
             <a:ext cx="4572000" cy="3430306"/>
           </a:xfrm>
           <a:prstGeom prst="rect">
@@ -4438,7 +4528,7 @@
       </p:pic>
       <p:pic>
         <p:nvPicPr>
-          <p:cNvPr id="3" name="Picture 2"/>
+          <p:cNvPr id="7" name="Picture 6"/>
           <p:cNvPicPr>
             <a:picLocks noChangeAspect="1"/>
           </p:cNvPicPr>
@@ -4452,7 +4542,7 @@
         </p:blipFill>
         <p:spPr>
           <a:xfrm>
-            <a:off x="6545943" y="0"/>
+            <a:off x="6353175" y="1408394"/>
             <a:ext cx="4572000" cy="3430306"/>
           </a:xfrm>
           <a:prstGeom prst="rect">
@@ -4460,64 +4550,54 @@
           </a:prstGeom>
         </p:spPr>
       </p:pic>
-      <p:pic>
-        <p:nvPicPr>
-          <p:cNvPr id="4" name="Picture 3"/>
-          <p:cNvPicPr>
-            <a:picLocks noChangeAspect="1"/>
-          </p:cNvPicPr>
+      <p:sp>
+        <p:nvSpPr>
+          <p:cNvPr id="6" name="TextBox 5"/>
+          <p:cNvSpPr txBox="1"/>
           <p:nvPr/>
-        </p:nvPicPr>
-        <p:blipFill>
-          <a:blip r:embed="rId4"/>
-          <a:stretch>
-            <a:fillRect/>
-          </a:stretch>
-        </p:blipFill>
-        <p:spPr>
-          <a:xfrm>
-            <a:off x="1628407" y="3427694"/>
-            <a:ext cx="4572000" cy="3430306"/>
+        </p:nvSpPr>
+        <p:spPr>
+          <a:xfrm>
+            <a:off x="7129534" y="4838700"/>
+            <a:ext cx="3152632" cy="646331"/>
           </a:xfrm>
           <a:prstGeom prst="rect">
             <a:avLst/>
           </a:prstGeom>
-        </p:spPr>
-      </p:pic>
-      <p:pic>
-        <p:nvPicPr>
-          <p:cNvPr id="5" name="Picture 4"/>
-          <p:cNvPicPr>
-            <a:picLocks noChangeAspect="1"/>
-          </p:cNvPicPr>
-          <p:nvPr/>
-        </p:nvPicPr>
-        <p:blipFill>
-          <a:blip r:embed="rId5"/>
-          <a:stretch>
-            <a:fillRect/>
-          </a:stretch>
-        </p:blipFill>
-        <p:spPr>
-          <a:xfrm>
-            <a:off x="6545943" y="3427694"/>
-            <a:ext cx="4572000" cy="3430306"/>
-          </a:xfrm>
-          <a:prstGeom prst="rect">
-            <a:avLst/>
-          </a:prstGeom>
-        </p:spPr>
-      </p:pic>
+          <a:noFill/>
+        </p:spPr>
+        <p:txBody>
+          <a:bodyPr wrap="square" rtlCol="0">
+            <a:spAutoFit/>
+          </a:bodyPr>
+          <a:lstStyle/>
+          <a:p>
+            <a:pPr algn="ctr"/>
+            <a:r>
+              <a:rPr lang="en-US" altLang="zh-TW" dirty="0" smtClean="0"/>
+              <a:t>Solution quality is not better with finer grid:(</a:t>
+            </a:r>
+            <a:endParaRPr lang="zh-TW" altLang="en-US" dirty="0"/>
+          </a:p>
+        </p:txBody>
+      </p:sp>
     </p:spTree>
     <p:extLst>
       <p:ext uri="{BB962C8B-B14F-4D97-AF65-F5344CB8AC3E}">
-        <p14:creationId xmlns:p14="http://schemas.microsoft.com/office/powerpoint/2010/main" val="4072812127"/>
+        <p14:creationId xmlns:p14="http://schemas.microsoft.com/office/powerpoint/2010/main" val="2687857575"/>
       </p:ext>
     </p:extLst>
   </p:cSld>
   <p:clrMapOvr>
     <a:masterClrMapping/>
   </p:clrMapOvr>
+  <p:timing>
+    <p:tnLst>
+      <p:par>
+        <p:cTn id="1" dur="indefinite" restart="never" nodeType="tmRoot"/>
+      </p:par>
+    </p:tnLst>
+  </p:timing>
 </p:sld>
 </file>
 
@@ -4554,8 +4634,80 @@
         </p:blipFill>
         <p:spPr>
           <a:xfrm>
-            <a:off x="1927224" y="0"/>
-            <a:ext cx="9140518" cy="6858000"/>
+            <a:off x="1628407" y="0"/>
+            <a:ext cx="4572000" cy="3430306"/>
+          </a:xfrm>
+          <a:prstGeom prst="rect">
+            <a:avLst/>
+          </a:prstGeom>
+        </p:spPr>
+      </p:pic>
+      <p:pic>
+        <p:nvPicPr>
+          <p:cNvPr id="3" name="Picture 2"/>
+          <p:cNvPicPr>
+            <a:picLocks noChangeAspect="1"/>
+          </p:cNvPicPr>
+          <p:nvPr/>
+        </p:nvPicPr>
+        <p:blipFill>
+          <a:blip r:embed="rId3"/>
+          <a:stretch>
+            <a:fillRect/>
+          </a:stretch>
+        </p:blipFill>
+        <p:spPr>
+          <a:xfrm>
+            <a:off x="6545943" y="0"/>
+            <a:ext cx="4572000" cy="3430306"/>
+          </a:xfrm>
+          <a:prstGeom prst="rect">
+            <a:avLst/>
+          </a:prstGeom>
+        </p:spPr>
+      </p:pic>
+      <p:pic>
+        <p:nvPicPr>
+          <p:cNvPr id="4" name="Picture 3"/>
+          <p:cNvPicPr>
+            <a:picLocks noChangeAspect="1"/>
+          </p:cNvPicPr>
+          <p:nvPr/>
+        </p:nvPicPr>
+        <p:blipFill>
+          <a:blip r:embed="rId4"/>
+          <a:stretch>
+            <a:fillRect/>
+          </a:stretch>
+        </p:blipFill>
+        <p:spPr>
+          <a:xfrm>
+            <a:off x="1628407" y="3427694"/>
+            <a:ext cx="4572000" cy="3430306"/>
+          </a:xfrm>
+          <a:prstGeom prst="rect">
+            <a:avLst/>
+          </a:prstGeom>
+        </p:spPr>
+      </p:pic>
+      <p:pic>
+        <p:nvPicPr>
+          <p:cNvPr id="5" name="Picture 4"/>
+          <p:cNvPicPr>
+            <a:picLocks noChangeAspect="1"/>
+          </p:cNvPicPr>
+          <p:nvPr/>
+        </p:nvPicPr>
+        <p:blipFill>
+          <a:blip r:embed="rId5"/>
+          <a:stretch>
+            <a:fillRect/>
+          </a:stretch>
+        </p:blipFill>
+        <p:spPr>
+          <a:xfrm>
+            <a:off x="6545943" y="3427694"/>
+            <a:ext cx="4572000" cy="3430306"/>
           </a:xfrm>
           <a:prstGeom prst="rect">
             <a:avLst/>
@@ -4565,20 +4717,13 @@
     </p:spTree>
     <p:extLst>
       <p:ext uri="{BB962C8B-B14F-4D97-AF65-F5344CB8AC3E}">
-        <p14:creationId xmlns:p14="http://schemas.microsoft.com/office/powerpoint/2010/main" val="3232639814"/>
+        <p14:creationId xmlns:p14="http://schemas.microsoft.com/office/powerpoint/2010/main" val="4072812127"/>
       </p:ext>
     </p:extLst>
   </p:cSld>
   <p:clrMapOvr>
     <a:masterClrMapping/>
   </p:clrMapOvr>
-  <p:timing>
-    <p:tnLst>
-      <p:par>
-        <p:cTn id="1" dur="indefinite" restart="never" nodeType="tmRoot"/>
-      </p:par>
-    </p:tnLst>
-  </p:timing>
 </p:sld>
 </file>
 

</xml_diff>

<commit_message>
add v_sd & v_ed
Starting entry that is not nan
Ending entry that is not nan
</commit_message>
<xml_diff>
--- a/Presentation1.pptx
+++ b/Presentation1.pptx
@@ -255,7 +255,7 @@
           <a:p>
             <a:fld id="{D638DB22-397D-48F1-BDCF-E66CBFA46A5C}" type="datetimeFigureOut">
               <a:rPr lang="zh-TW" altLang="en-US" smtClean="0"/>
-              <a:t>2015/12/21</a:t>
+              <a:t>2015/12/22</a:t>
             </a:fld>
             <a:endParaRPr lang="zh-TW" altLang="en-US"/>
           </a:p>
@@ -425,7 +425,7 @@
           <a:p>
             <a:fld id="{D638DB22-397D-48F1-BDCF-E66CBFA46A5C}" type="datetimeFigureOut">
               <a:rPr lang="zh-TW" altLang="en-US" smtClean="0"/>
-              <a:t>2015/12/21</a:t>
+              <a:t>2015/12/22</a:t>
             </a:fld>
             <a:endParaRPr lang="zh-TW" altLang="en-US"/>
           </a:p>
@@ -605,7 +605,7 @@
           <a:p>
             <a:fld id="{D638DB22-397D-48F1-BDCF-E66CBFA46A5C}" type="datetimeFigureOut">
               <a:rPr lang="zh-TW" altLang="en-US" smtClean="0"/>
-              <a:t>2015/12/21</a:t>
+              <a:t>2015/12/22</a:t>
             </a:fld>
             <a:endParaRPr lang="zh-TW" altLang="en-US"/>
           </a:p>
@@ -775,7 +775,7 @@
           <a:p>
             <a:fld id="{D638DB22-397D-48F1-BDCF-E66CBFA46A5C}" type="datetimeFigureOut">
               <a:rPr lang="zh-TW" altLang="en-US" smtClean="0"/>
-              <a:t>2015/12/21</a:t>
+              <a:t>2015/12/22</a:t>
             </a:fld>
             <a:endParaRPr lang="zh-TW" altLang="en-US"/>
           </a:p>
@@ -1021,7 +1021,7 @@
           <a:p>
             <a:fld id="{D638DB22-397D-48F1-BDCF-E66CBFA46A5C}" type="datetimeFigureOut">
               <a:rPr lang="zh-TW" altLang="en-US" smtClean="0"/>
-              <a:t>2015/12/21</a:t>
+              <a:t>2015/12/22</a:t>
             </a:fld>
             <a:endParaRPr lang="zh-TW" altLang="en-US"/>
           </a:p>
@@ -1253,7 +1253,7 @@
           <a:p>
             <a:fld id="{D638DB22-397D-48F1-BDCF-E66CBFA46A5C}" type="datetimeFigureOut">
               <a:rPr lang="zh-TW" altLang="en-US" smtClean="0"/>
-              <a:t>2015/12/21</a:t>
+              <a:t>2015/12/22</a:t>
             </a:fld>
             <a:endParaRPr lang="zh-TW" altLang="en-US"/>
           </a:p>
@@ -1620,7 +1620,7 @@
           <a:p>
             <a:fld id="{D638DB22-397D-48F1-BDCF-E66CBFA46A5C}" type="datetimeFigureOut">
               <a:rPr lang="zh-TW" altLang="en-US" smtClean="0"/>
-              <a:t>2015/12/21</a:t>
+              <a:t>2015/12/22</a:t>
             </a:fld>
             <a:endParaRPr lang="zh-TW" altLang="en-US"/>
           </a:p>
@@ -1738,7 +1738,7 @@
           <a:p>
             <a:fld id="{D638DB22-397D-48F1-BDCF-E66CBFA46A5C}" type="datetimeFigureOut">
               <a:rPr lang="zh-TW" altLang="en-US" smtClean="0"/>
-              <a:t>2015/12/21</a:t>
+              <a:t>2015/12/22</a:t>
             </a:fld>
             <a:endParaRPr lang="zh-TW" altLang="en-US"/>
           </a:p>
@@ -1833,7 +1833,7 @@
           <a:p>
             <a:fld id="{D638DB22-397D-48F1-BDCF-E66CBFA46A5C}" type="datetimeFigureOut">
               <a:rPr lang="zh-TW" altLang="en-US" smtClean="0"/>
-              <a:t>2015/12/21</a:t>
+              <a:t>2015/12/22</a:t>
             </a:fld>
             <a:endParaRPr lang="zh-TW" altLang="en-US"/>
           </a:p>
@@ -2110,7 +2110,7 @@
           <a:p>
             <a:fld id="{D638DB22-397D-48F1-BDCF-E66CBFA46A5C}" type="datetimeFigureOut">
               <a:rPr lang="zh-TW" altLang="en-US" smtClean="0"/>
-              <a:t>2015/12/21</a:t>
+              <a:t>2015/12/22</a:t>
             </a:fld>
             <a:endParaRPr lang="zh-TW" altLang="en-US"/>
           </a:p>
@@ -2363,7 +2363,7 @@
           <a:p>
             <a:fld id="{D638DB22-397D-48F1-BDCF-E66CBFA46A5C}" type="datetimeFigureOut">
               <a:rPr lang="zh-TW" altLang="en-US" smtClean="0"/>
-              <a:t>2015/12/21</a:t>
+              <a:t>2015/12/22</a:t>
             </a:fld>
             <a:endParaRPr lang="zh-TW" altLang="en-US"/>
           </a:p>
@@ -2576,7 +2576,7 @@
           <a:p>
             <a:fld id="{D638DB22-397D-48F1-BDCF-E66CBFA46A5C}" type="datetimeFigureOut">
               <a:rPr lang="zh-TW" altLang="en-US" smtClean="0"/>
-              <a:t>2015/12/21</a:t>
+              <a:t>2015/12/22</a:t>
             </a:fld>
             <a:endParaRPr lang="zh-TW" altLang="en-US"/>
           </a:p>
@@ -3361,7 +3361,7 @@
         </p:blipFill>
         <p:spPr>
           <a:xfrm>
-            <a:off x="1928812" y="304800"/>
+            <a:off x="2119312" y="190500"/>
             <a:ext cx="8334375" cy="6248400"/>
           </a:xfrm>
           <a:prstGeom prst="rect">

</xml_diff>